<commit_message>
adicao de novas aulas
</commit_message>
<xml_diff>
--- a/API/Aula_1.pptx
+++ b/API/Aula_1.pptx
@@ -3727,7 +3727,7 @@
           <a:p>
             <a:fld id="{844FB9E1-4EC7-AC49-AF29-CA6F74E5D15F}" type="datetimeFigureOut">
               <a:rPr lang="pt-BR" smtClean="0"/>
-              <a:t>17/02/2024</a:t>
+              <a:t>20/02/2024</a:t>
             </a:fld>
             <a:endParaRPr lang="pt-BR"/>
           </a:p>
@@ -3925,7 +3925,7 @@
           <a:p>
             <a:fld id="{844FB9E1-4EC7-AC49-AF29-CA6F74E5D15F}" type="datetimeFigureOut">
               <a:rPr lang="pt-BR" smtClean="0"/>
-              <a:t>17/02/2024</a:t>
+              <a:t>20/02/2024</a:t>
             </a:fld>
             <a:endParaRPr lang="pt-BR"/>
           </a:p>
@@ -4133,7 +4133,7 @@
           <a:p>
             <a:fld id="{844FB9E1-4EC7-AC49-AF29-CA6F74E5D15F}" type="datetimeFigureOut">
               <a:rPr lang="pt-BR" smtClean="0"/>
-              <a:t>17/02/2024</a:t>
+              <a:t>20/02/2024</a:t>
             </a:fld>
             <a:endParaRPr lang="pt-BR"/>
           </a:p>
@@ -4336,7 +4336,7 @@
           <a:p>
             <a:fld id="{844FB9E1-4EC7-AC49-AF29-CA6F74E5D15F}" type="datetimeFigureOut">
               <a:rPr lang="pt-BR" smtClean="0"/>
-              <a:t>17/02/2024</a:t>
+              <a:t>20/02/2024</a:t>
             </a:fld>
             <a:endParaRPr lang="pt-BR"/>
           </a:p>
@@ -4611,7 +4611,7 @@
           <a:p>
             <a:fld id="{844FB9E1-4EC7-AC49-AF29-CA6F74E5D15F}" type="datetimeFigureOut">
               <a:rPr lang="pt-BR" smtClean="0"/>
-              <a:t>17/02/2024</a:t>
+              <a:t>20/02/2024</a:t>
             </a:fld>
             <a:endParaRPr lang="pt-BR"/>
           </a:p>
@@ -4876,7 +4876,7 @@
           <a:p>
             <a:fld id="{844FB9E1-4EC7-AC49-AF29-CA6F74E5D15F}" type="datetimeFigureOut">
               <a:rPr lang="pt-BR" smtClean="0"/>
-              <a:t>17/02/2024</a:t>
+              <a:t>20/02/2024</a:t>
             </a:fld>
             <a:endParaRPr lang="pt-BR"/>
           </a:p>
@@ -5288,7 +5288,7 @@
           <a:p>
             <a:fld id="{844FB9E1-4EC7-AC49-AF29-CA6F74E5D15F}" type="datetimeFigureOut">
               <a:rPr lang="pt-BR" smtClean="0"/>
-              <a:t>17/02/2024</a:t>
+              <a:t>20/02/2024</a:t>
             </a:fld>
             <a:endParaRPr lang="pt-BR"/>
           </a:p>
@@ -5429,7 +5429,7 @@
           <a:p>
             <a:fld id="{844FB9E1-4EC7-AC49-AF29-CA6F74E5D15F}" type="datetimeFigureOut">
               <a:rPr lang="pt-BR" smtClean="0"/>
-              <a:t>17/02/2024</a:t>
+              <a:t>20/02/2024</a:t>
             </a:fld>
             <a:endParaRPr lang="pt-BR"/>
           </a:p>
@@ -5542,7 +5542,7 @@
           <a:p>
             <a:fld id="{844FB9E1-4EC7-AC49-AF29-CA6F74E5D15F}" type="datetimeFigureOut">
               <a:rPr lang="pt-BR" smtClean="0"/>
-              <a:t>17/02/2024</a:t>
+              <a:t>20/02/2024</a:t>
             </a:fld>
             <a:endParaRPr lang="pt-BR"/>
           </a:p>
@@ -5882,7 +5882,7 @@
           <a:p>
             <a:fld id="{844FB9E1-4EC7-AC49-AF29-CA6F74E5D15F}" type="datetimeFigureOut">
               <a:rPr lang="pt-BR" smtClean="0"/>
-              <a:t>17/02/2024</a:t>
+              <a:t>20/02/2024</a:t>
             </a:fld>
             <a:endParaRPr lang="pt-BR"/>
           </a:p>
@@ -6170,7 +6170,7 @@
           <a:p>
             <a:fld id="{844FB9E1-4EC7-AC49-AF29-CA6F74E5D15F}" type="datetimeFigureOut">
               <a:rPr lang="pt-BR" smtClean="0"/>
-              <a:t>17/02/2024</a:t>
+              <a:t>20/02/2024</a:t>
             </a:fld>
             <a:endParaRPr lang="pt-BR"/>
           </a:p>
@@ -6411,7 +6411,7 @@
           <a:p>
             <a:fld id="{844FB9E1-4EC7-AC49-AF29-CA6F74E5D15F}" type="datetimeFigureOut">
               <a:rPr lang="pt-BR" smtClean="0"/>
-              <a:t>17/02/2024</a:t>
+              <a:t>20/02/2024</a:t>
             </a:fld>
             <a:endParaRPr lang="pt-BR"/>
           </a:p>
@@ -9961,7 +9961,7 @@
         <p:spPr>
           <a:xfrm>
             <a:off x="3131298" y="77002"/>
-            <a:ext cx="6351611" cy="646331"/>
+            <a:ext cx="6540958" cy="646331"/>
           </a:xfrm>
           <a:prstGeom prst="rect">
             <a:avLst/>
@@ -9976,19 +9976,11 @@
           <a:p>
             <a:r>
               <a:rPr lang="pt-BR" sz="3600" dirty="0"/>
-              <a:t>Juntando o </a:t>
+              <a:t>Adicionando o código ao </a:t>
             </a:r>
             <a:r>
               <a:rPr lang="pt-BR" sz="3600" dirty="0" err="1"/>
               <a:t>frontend</a:t>
-            </a:r>
-            <a:r>
-              <a:rPr lang="pt-BR" sz="3600" dirty="0"/>
-              <a:t> e o </a:t>
-            </a:r>
-            <a:r>
-              <a:rPr lang="pt-BR" sz="3600" dirty="0" err="1"/>
-              <a:t>backend</a:t>
             </a:r>
             <a:endParaRPr lang="pt-BR" sz="3600" dirty="0"/>
           </a:p>
@@ -10009,7 +10001,7 @@
         <p:spPr>
           <a:xfrm>
             <a:off x="4172312" y="1221064"/>
-            <a:ext cx="7846433" cy="4893647"/>
+            <a:ext cx="7846433" cy="4524315"/>
           </a:xfrm>
           <a:prstGeom prst="rect">
             <a:avLst/>
@@ -10842,169 +10834,6 @@
               </a:rPr>
               <a:t>		</a:t>
             </a:r>
-            <a:r>
-              <a:rPr lang="pt-BR" sz="1200" b="0" dirty="0" err="1">
-                <a:solidFill>
-                  <a:srgbClr val="569CD6"/>
-                </a:solidFill>
-                <a:effectLst/>
-                <a:latin typeface="Menlo" panose="020B0609030804020204" pitchFamily="49" charset="0"/>
-              </a:rPr>
-              <a:t>const</a:t>
-            </a:r>
-            <a:r>
-              <a:rPr lang="pt-BR" sz="1200" b="0" dirty="0">
-                <a:solidFill>
-                  <a:srgbClr val="D4D4D4"/>
-                </a:solidFill>
-                <a:effectLst/>
-                <a:latin typeface="Menlo" panose="020B0609030804020204" pitchFamily="49" charset="0"/>
-              </a:rPr>
-              <a:t> </a:t>
-            </a:r>
-            <a:r>
-              <a:rPr lang="pt-BR" sz="1200" b="0" dirty="0" err="1">
-                <a:solidFill>
-                  <a:srgbClr val="4FC1FF"/>
-                </a:solidFill>
-                <a:effectLst/>
-                <a:latin typeface="Menlo" panose="020B0609030804020204" pitchFamily="49" charset="0"/>
-              </a:rPr>
-              <a:t>number_of_tickets</a:t>
-            </a:r>
-            <a:r>
-              <a:rPr lang="pt-BR" sz="1200" b="0" dirty="0">
-                <a:solidFill>
-                  <a:srgbClr val="D4D4D4"/>
-                </a:solidFill>
-                <a:effectLst/>
-                <a:latin typeface="Menlo" panose="020B0609030804020204" pitchFamily="49" charset="0"/>
-              </a:rPr>
-              <a:t> = </a:t>
-            </a:r>
-          </a:p>
-          <a:p>
-            <a:pPr lvl="1"/>
-            <a:r>
-              <a:rPr lang="pt-BR" sz="1200" b="0" dirty="0">
-                <a:solidFill>
-                  <a:srgbClr val="4EC9B0"/>
-                </a:solidFill>
-                <a:effectLst/>
-                <a:latin typeface="Menlo" panose="020B0609030804020204" pitchFamily="49" charset="0"/>
-              </a:rPr>
-              <a:t>		</a:t>
-            </a:r>
-            <a:r>
-              <a:rPr lang="pt-BR" sz="1200" b="0" dirty="0" err="1">
-                <a:solidFill>
-                  <a:srgbClr val="4EC9B0"/>
-                </a:solidFill>
-                <a:effectLst/>
-                <a:latin typeface="Menlo" panose="020B0609030804020204" pitchFamily="49" charset="0"/>
-              </a:rPr>
-              <a:t>Object</a:t>
-            </a:r>
-            <a:r>
-              <a:rPr lang="pt-BR" sz="1200" b="0" dirty="0" err="1">
-                <a:solidFill>
-                  <a:srgbClr val="D4D4D4"/>
-                </a:solidFill>
-                <a:effectLst/>
-                <a:latin typeface="Menlo" panose="020B0609030804020204" pitchFamily="49" charset="0"/>
-              </a:rPr>
-              <a:t>.</a:t>
-            </a:r>
-            <a:r>
-              <a:rPr lang="pt-BR" sz="1200" b="0" dirty="0" err="1">
-                <a:solidFill>
-                  <a:srgbClr val="DCDCAA"/>
-                </a:solidFill>
-                <a:effectLst/>
-                <a:latin typeface="Menlo" panose="020B0609030804020204" pitchFamily="49" charset="0"/>
-              </a:rPr>
-              <a:t>keys</a:t>
-            </a:r>
-            <a:r>
-              <a:rPr lang="pt-BR" sz="1200" b="0" dirty="0">
-                <a:solidFill>
-                  <a:srgbClr val="D4D4D4"/>
-                </a:solidFill>
-                <a:effectLst/>
-                <a:latin typeface="Menlo" panose="020B0609030804020204" pitchFamily="49" charset="0"/>
-              </a:rPr>
-              <a:t>(</a:t>
-            </a:r>
-            <a:r>
-              <a:rPr lang="pt-BR" sz="1200" b="0" dirty="0" err="1">
-                <a:solidFill>
-                  <a:srgbClr val="4FC1FF"/>
-                </a:solidFill>
-                <a:effectLst/>
-                <a:latin typeface="Menlo" panose="020B0609030804020204" pitchFamily="49" charset="0"/>
-              </a:rPr>
-              <a:t>data</a:t>
-            </a:r>
-            <a:r>
-              <a:rPr lang="pt-BR" sz="1200" b="0" dirty="0" err="1">
-                <a:solidFill>
-                  <a:srgbClr val="D4D4D4"/>
-                </a:solidFill>
-                <a:effectLst/>
-                <a:latin typeface="Menlo" panose="020B0609030804020204" pitchFamily="49" charset="0"/>
-              </a:rPr>
-              <a:t>.</a:t>
-            </a:r>
-            <a:r>
-              <a:rPr lang="pt-BR" sz="1200" b="0" dirty="0" err="1">
-                <a:solidFill>
-                  <a:srgbClr val="9CDCFE"/>
-                </a:solidFill>
-                <a:effectLst/>
-                <a:latin typeface="Menlo" panose="020B0609030804020204" pitchFamily="49" charset="0"/>
-              </a:rPr>
-              <a:t>conversion_rates</a:t>
-            </a:r>
-            <a:r>
-              <a:rPr lang="pt-BR" sz="1200" b="0" dirty="0">
-                <a:solidFill>
-                  <a:srgbClr val="D4D4D4"/>
-                </a:solidFill>
-                <a:effectLst/>
-                <a:latin typeface="Menlo" panose="020B0609030804020204" pitchFamily="49" charset="0"/>
-              </a:rPr>
-              <a:t>).</a:t>
-            </a:r>
-            <a:r>
-              <a:rPr lang="pt-BR" sz="1200" b="0" dirty="0" err="1">
-                <a:solidFill>
-                  <a:srgbClr val="9CDCFE"/>
-                </a:solidFill>
-                <a:effectLst/>
-                <a:latin typeface="Menlo" panose="020B0609030804020204" pitchFamily="49" charset="0"/>
-              </a:rPr>
-              <a:t>length</a:t>
-            </a:r>
-            <a:r>
-              <a:rPr lang="pt-BR" sz="1200" b="0" dirty="0">
-                <a:solidFill>
-                  <a:srgbClr val="D4D4D4"/>
-                </a:solidFill>
-                <a:effectLst/>
-                <a:latin typeface="Menlo" panose="020B0609030804020204" pitchFamily="49" charset="0"/>
-              </a:rPr>
-              <a:t>;</a:t>
-            </a:r>
-            <a:endParaRPr lang="pt-BR" sz="1200" b="0" dirty="0">
-              <a:solidFill>
-                <a:srgbClr val="CCCCCC"/>
-              </a:solidFill>
-              <a:effectLst/>
-              <a:latin typeface="Menlo" panose="020B0609030804020204" pitchFamily="49" charset="0"/>
-            </a:endParaRPr>
-          </a:p>
-          <a:p>
-            <a:pPr lvl="1"/>
             <a:br>
               <a:rPr lang="pt-BR" sz="1200" b="0" dirty="0">
                 <a:solidFill>

</xml_diff>